<commit_message>
gurufication van de warehouse powerpoint
</commit_message>
<xml_diff>
--- a/warehouse/Warehouse kata - startin with Unit Testing.pptx
+++ b/warehouse/Warehouse kata - startin with Unit Testing.pptx
@@ -6414,7 +6414,503 @@
   <p:timing>
     <p:tnLst>
       <p:par>
-        <p:cTn id="1" dur="indefinite" restart="never" nodeType="tmRoot"/>
+        <p:cTn id="1" dur="indefinite" restart="never" nodeType="tmRoot">
+          <p:childTnLst>
+            <p:seq concurrent="1" nextAc="seek">
+              <p:cTn id="2" dur="indefinite" nodeType="mainSeq">
+                <p:childTnLst>
+                  <p:par>
+                    <p:cTn id="3" fill="hold">
+                      <p:stCondLst>
+                        <p:cond delay="indefinite"/>
+                      </p:stCondLst>
+                      <p:childTnLst>
+                        <p:par>
+                          <p:cTn id="4" fill="hold">
+                            <p:stCondLst>
+                              <p:cond delay="0"/>
+                            </p:stCondLst>
+                            <p:childTnLst>
+                              <p:par>
+                                <p:cTn id="5" presetID="2" presetClass="entr" presetSubtype="4" fill="hold" nodeType="clickEffect">
+                                  <p:stCondLst>
+                                    <p:cond delay="0"/>
+                                  </p:stCondLst>
+                                  <p:childTnLst>
+                                    <p:set>
+                                      <p:cBhvr>
+                                        <p:cTn id="6" dur="1" fill="hold">
+                                          <p:stCondLst>
+                                            <p:cond delay="0"/>
+                                          </p:stCondLst>
+                                        </p:cTn>
+                                        <p:tgtEl>
+                                          <p:spTgt spid="6">
+                                            <p:txEl>
+                                              <p:pRg st="1" end="1"/>
+                                            </p:txEl>
+                                          </p:spTgt>
+                                        </p:tgtEl>
+                                        <p:attrNameLst>
+                                          <p:attrName>style.visibility</p:attrName>
+                                        </p:attrNameLst>
+                                      </p:cBhvr>
+                                      <p:to>
+                                        <p:strVal val="visible"/>
+                                      </p:to>
+                                    </p:set>
+                                    <p:anim calcmode="lin" valueType="num">
+                                      <p:cBhvr additive="base">
+                                        <p:cTn id="7" dur="500" fill="hold"/>
+                                        <p:tgtEl>
+                                          <p:spTgt spid="6">
+                                            <p:txEl>
+                                              <p:pRg st="1" end="1"/>
+                                            </p:txEl>
+                                          </p:spTgt>
+                                        </p:tgtEl>
+                                        <p:attrNameLst>
+                                          <p:attrName>ppt_x</p:attrName>
+                                        </p:attrNameLst>
+                                      </p:cBhvr>
+                                      <p:tavLst>
+                                        <p:tav tm="0">
+                                          <p:val>
+                                            <p:strVal val="#ppt_x"/>
+                                          </p:val>
+                                        </p:tav>
+                                        <p:tav tm="100000">
+                                          <p:val>
+                                            <p:strVal val="#ppt_x"/>
+                                          </p:val>
+                                        </p:tav>
+                                      </p:tavLst>
+                                    </p:anim>
+                                    <p:anim calcmode="lin" valueType="num">
+                                      <p:cBhvr additive="base">
+                                        <p:cTn id="8" dur="500" fill="hold"/>
+                                        <p:tgtEl>
+                                          <p:spTgt spid="6">
+                                            <p:txEl>
+                                              <p:pRg st="1" end="1"/>
+                                            </p:txEl>
+                                          </p:spTgt>
+                                        </p:tgtEl>
+                                        <p:attrNameLst>
+                                          <p:attrName>ppt_y</p:attrName>
+                                        </p:attrNameLst>
+                                      </p:cBhvr>
+                                      <p:tavLst>
+                                        <p:tav tm="0">
+                                          <p:val>
+                                            <p:strVal val="1+#ppt_h/2"/>
+                                          </p:val>
+                                        </p:tav>
+                                        <p:tav tm="100000">
+                                          <p:val>
+                                            <p:strVal val="#ppt_y"/>
+                                          </p:val>
+                                        </p:tav>
+                                      </p:tavLst>
+                                    </p:anim>
+                                  </p:childTnLst>
+                                </p:cTn>
+                              </p:par>
+                            </p:childTnLst>
+                          </p:cTn>
+                        </p:par>
+                      </p:childTnLst>
+                    </p:cTn>
+                  </p:par>
+                  <p:par>
+                    <p:cTn id="9" fill="hold">
+                      <p:stCondLst>
+                        <p:cond delay="indefinite"/>
+                      </p:stCondLst>
+                      <p:childTnLst>
+                        <p:par>
+                          <p:cTn id="10" fill="hold">
+                            <p:stCondLst>
+                              <p:cond delay="0"/>
+                            </p:stCondLst>
+                            <p:childTnLst>
+                              <p:par>
+                                <p:cTn id="11" presetID="2" presetClass="entr" presetSubtype="4" fill="hold" nodeType="clickEffect">
+                                  <p:stCondLst>
+                                    <p:cond delay="0"/>
+                                  </p:stCondLst>
+                                  <p:childTnLst>
+                                    <p:set>
+                                      <p:cBhvr>
+                                        <p:cTn id="12" dur="1" fill="hold">
+                                          <p:stCondLst>
+                                            <p:cond delay="0"/>
+                                          </p:stCondLst>
+                                        </p:cTn>
+                                        <p:tgtEl>
+                                          <p:spTgt spid="6">
+                                            <p:txEl>
+                                              <p:pRg st="2" end="2"/>
+                                            </p:txEl>
+                                          </p:spTgt>
+                                        </p:tgtEl>
+                                        <p:attrNameLst>
+                                          <p:attrName>style.visibility</p:attrName>
+                                        </p:attrNameLst>
+                                      </p:cBhvr>
+                                      <p:to>
+                                        <p:strVal val="visible"/>
+                                      </p:to>
+                                    </p:set>
+                                    <p:anim calcmode="lin" valueType="num">
+                                      <p:cBhvr additive="base">
+                                        <p:cTn id="13" dur="500" fill="hold"/>
+                                        <p:tgtEl>
+                                          <p:spTgt spid="6">
+                                            <p:txEl>
+                                              <p:pRg st="2" end="2"/>
+                                            </p:txEl>
+                                          </p:spTgt>
+                                        </p:tgtEl>
+                                        <p:attrNameLst>
+                                          <p:attrName>ppt_x</p:attrName>
+                                        </p:attrNameLst>
+                                      </p:cBhvr>
+                                      <p:tavLst>
+                                        <p:tav tm="0">
+                                          <p:val>
+                                            <p:strVal val="#ppt_x"/>
+                                          </p:val>
+                                        </p:tav>
+                                        <p:tav tm="100000">
+                                          <p:val>
+                                            <p:strVal val="#ppt_x"/>
+                                          </p:val>
+                                        </p:tav>
+                                      </p:tavLst>
+                                    </p:anim>
+                                    <p:anim calcmode="lin" valueType="num">
+                                      <p:cBhvr additive="base">
+                                        <p:cTn id="14" dur="500" fill="hold"/>
+                                        <p:tgtEl>
+                                          <p:spTgt spid="6">
+                                            <p:txEl>
+                                              <p:pRg st="2" end="2"/>
+                                            </p:txEl>
+                                          </p:spTgt>
+                                        </p:tgtEl>
+                                        <p:attrNameLst>
+                                          <p:attrName>ppt_y</p:attrName>
+                                        </p:attrNameLst>
+                                      </p:cBhvr>
+                                      <p:tavLst>
+                                        <p:tav tm="0">
+                                          <p:val>
+                                            <p:strVal val="1+#ppt_h/2"/>
+                                          </p:val>
+                                        </p:tav>
+                                        <p:tav tm="100000">
+                                          <p:val>
+                                            <p:strVal val="#ppt_y"/>
+                                          </p:val>
+                                        </p:tav>
+                                      </p:tavLst>
+                                    </p:anim>
+                                  </p:childTnLst>
+                                </p:cTn>
+                              </p:par>
+                            </p:childTnLst>
+                          </p:cTn>
+                        </p:par>
+                      </p:childTnLst>
+                    </p:cTn>
+                  </p:par>
+                  <p:par>
+                    <p:cTn id="15" fill="hold">
+                      <p:stCondLst>
+                        <p:cond delay="indefinite"/>
+                      </p:stCondLst>
+                      <p:childTnLst>
+                        <p:par>
+                          <p:cTn id="16" fill="hold">
+                            <p:stCondLst>
+                              <p:cond delay="0"/>
+                            </p:stCondLst>
+                            <p:childTnLst>
+                              <p:par>
+                                <p:cTn id="17" presetID="2" presetClass="entr" presetSubtype="4" fill="hold" nodeType="clickEffect">
+                                  <p:stCondLst>
+                                    <p:cond delay="0"/>
+                                  </p:stCondLst>
+                                  <p:childTnLst>
+                                    <p:set>
+                                      <p:cBhvr>
+                                        <p:cTn id="18" dur="1" fill="hold">
+                                          <p:stCondLst>
+                                            <p:cond delay="0"/>
+                                          </p:stCondLst>
+                                        </p:cTn>
+                                        <p:tgtEl>
+                                          <p:spTgt spid="6">
+                                            <p:txEl>
+                                              <p:pRg st="3" end="3"/>
+                                            </p:txEl>
+                                          </p:spTgt>
+                                        </p:tgtEl>
+                                        <p:attrNameLst>
+                                          <p:attrName>style.visibility</p:attrName>
+                                        </p:attrNameLst>
+                                      </p:cBhvr>
+                                      <p:to>
+                                        <p:strVal val="visible"/>
+                                      </p:to>
+                                    </p:set>
+                                    <p:anim calcmode="lin" valueType="num">
+                                      <p:cBhvr additive="base">
+                                        <p:cTn id="19" dur="500" fill="hold"/>
+                                        <p:tgtEl>
+                                          <p:spTgt spid="6">
+                                            <p:txEl>
+                                              <p:pRg st="3" end="3"/>
+                                            </p:txEl>
+                                          </p:spTgt>
+                                        </p:tgtEl>
+                                        <p:attrNameLst>
+                                          <p:attrName>ppt_x</p:attrName>
+                                        </p:attrNameLst>
+                                      </p:cBhvr>
+                                      <p:tavLst>
+                                        <p:tav tm="0">
+                                          <p:val>
+                                            <p:strVal val="#ppt_x"/>
+                                          </p:val>
+                                        </p:tav>
+                                        <p:tav tm="100000">
+                                          <p:val>
+                                            <p:strVal val="#ppt_x"/>
+                                          </p:val>
+                                        </p:tav>
+                                      </p:tavLst>
+                                    </p:anim>
+                                    <p:anim calcmode="lin" valueType="num">
+                                      <p:cBhvr additive="base">
+                                        <p:cTn id="20" dur="500" fill="hold"/>
+                                        <p:tgtEl>
+                                          <p:spTgt spid="6">
+                                            <p:txEl>
+                                              <p:pRg st="3" end="3"/>
+                                            </p:txEl>
+                                          </p:spTgt>
+                                        </p:tgtEl>
+                                        <p:attrNameLst>
+                                          <p:attrName>ppt_y</p:attrName>
+                                        </p:attrNameLst>
+                                      </p:cBhvr>
+                                      <p:tavLst>
+                                        <p:tav tm="0">
+                                          <p:val>
+                                            <p:strVal val="1+#ppt_h/2"/>
+                                          </p:val>
+                                        </p:tav>
+                                        <p:tav tm="100000">
+                                          <p:val>
+                                            <p:strVal val="#ppt_y"/>
+                                          </p:val>
+                                        </p:tav>
+                                      </p:tavLst>
+                                    </p:anim>
+                                  </p:childTnLst>
+                                </p:cTn>
+                              </p:par>
+                            </p:childTnLst>
+                          </p:cTn>
+                        </p:par>
+                      </p:childTnLst>
+                    </p:cTn>
+                  </p:par>
+                  <p:par>
+                    <p:cTn id="21" fill="hold">
+                      <p:stCondLst>
+                        <p:cond delay="indefinite"/>
+                      </p:stCondLst>
+                      <p:childTnLst>
+                        <p:par>
+                          <p:cTn id="22" fill="hold">
+                            <p:stCondLst>
+                              <p:cond delay="0"/>
+                            </p:stCondLst>
+                            <p:childTnLst>
+                              <p:par>
+                                <p:cTn id="23" presetID="2" presetClass="entr" presetSubtype="4" fill="hold" nodeType="clickEffect">
+                                  <p:stCondLst>
+                                    <p:cond delay="0"/>
+                                  </p:stCondLst>
+                                  <p:childTnLst>
+                                    <p:set>
+                                      <p:cBhvr>
+                                        <p:cTn id="24" dur="1" fill="hold">
+                                          <p:stCondLst>
+                                            <p:cond delay="0"/>
+                                          </p:stCondLst>
+                                        </p:cTn>
+                                        <p:tgtEl>
+                                          <p:spTgt spid="6">
+                                            <p:txEl>
+                                              <p:pRg st="4" end="4"/>
+                                            </p:txEl>
+                                          </p:spTgt>
+                                        </p:tgtEl>
+                                        <p:attrNameLst>
+                                          <p:attrName>style.visibility</p:attrName>
+                                        </p:attrNameLst>
+                                      </p:cBhvr>
+                                      <p:to>
+                                        <p:strVal val="visible"/>
+                                      </p:to>
+                                    </p:set>
+                                    <p:anim calcmode="lin" valueType="num">
+                                      <p:cBhvr additive="base">
+                                        <p:cTn id="25" dur="500" fill="hold"/>
+                                        <p:tgtEl>
+                                          <p:spTgt spid="6">
+                                            <p:txEl>
+                                              <p:pRg st="4" end="4"/>
+                                            </p:txEl>
+                                          </p:spTgt>
+                                        </p:tgtEl>
+                                        <p:attrNameLst>
+                                          <p:attrName>ppt_x</p:attrName>
+                                        </p:attrNameLst>
+                                      </p:cBhvr>
+                                      <p:tavLst>
+                                        <p:tav tm="0">
+                                          <p:val>
+                                            <p:strVal val="#ppt_x"/>
+                                          </p:val>
+                                        </p:tav>
+                                        <p:tav tm="100000">
+                                          <p:val>
+                                            <p:strVal val="#ppt_x"/>
+                                          </p:val>
+                                        </p:tav>
+                                      </p:tavLst>
+                                    </p:anim>
+                                    <p:anim calcmode="lin" valueType="num">
+                                      <p:cBhvr additive="base">
+                                        <p:cTn id="26" dur="500" fill="hold"/>
+                                        <p:tgtEl>
+                                          <p:spTgt spid="6">
+                                            <p:txEl>
+                                              <p:pRg st="4" end="4"/>
+                                            </p:txEl>
+                                          </p:spTgt>
+                                        </p:tgtEl>
+                                        <p:attrNameLst>
+                                          <p:attrName>ppt_y</p:attrName>
+                                        </p:attrNameLst>
+                                      </p:cBhvr>
+                                      <p:tavLst>
+                                        <p:tav tm="0">
+                                          <p:val>
+                                            <p:strVal val="1+#ppt_h/2"/>
+                                          </p:val>
+                                        </p:tav>
+                                        <p:tav tm="100000">
+                                          <p:val>
+                                            <p:strVal val="#ppt_y"/>
+                                          </p:val>
+                                        </p:tav>
+                                      </p:tavLst>
+                                    </p:anim>
+                                  </p:childTnLst>
+                                </p:cTn>
+                              </p:par>
+                            </p:childTnLst>
+                          </p:cTn>
+                        </p:par>
+                      </p:childTnLst>
+                    </p:cTn>
+                  </p:par>
+                  <p:par>
+                    <p:cTn id="27" fill="hold">
+                      <p:stCondLst>
+                        <p:cond delay="indefinite"/>
+                      </p:stCondLst>
+                      <p:childTnLst>
+                        <p:par>
+                          <p:cTn id="28" fill="hold">
+                            <p:stCondLst>
+                              <p:cond delay="0"/>
+                            </p:stCondLst>
+                            <p:childTnLst>
+                              <p:par>
+                                <p:cTn id="29" presetID="6" presetClass="entr" presetSubtype="16" fill="hold" nodeType="clickEffect">
+                                  <p:stCondLst>
+                                    <p:cond delay="0"/>
+                                  </p:stCondLst>
+                                  <p:childTnLst>
+                                    <p:set>
+                                      <p:cBhvr>
+                                        <p:cTn id="30" dur="1" fill="hold">
+                                          <p:stCondLst>
+                                            <p:cond delay="0"/>
+                                          </p:stCondLst>
+                                        </p:cTn>
+                                        <p:tgtEl>
+                                          <p:spTgt spid="6">
+                                            <p:txEl>
+                                              <p:pRg st="7" end="7"/>
+                                            </p:txEl>
+                                          </p:spTgt>
+                                        </p:tgtEl>
+                                        <p:attrNameLst>
+                                          <p:attrName>style.visibility</p:attrName>
+                                        </p:attrNameLst>
+                                      </p:cBhvr>
+                                      <p:to>
+                                        <p:strVal val="visible"/>
+                                      </p:to>
+                                    </p:set>
+                                    <p:animEffect transition="in" filter="circle(in)">
+                                      <p:cBhvr>
+                                        <p:cTn id="31" dur="2000"/>
+                                        <p:tgtEl>
+                                          <p:spTgt spid="6">
+                                            <p:txEl>
+                                              <p:pRg st="7" end="7"/>
+                                            </p:txEl>
+                                          </p:spTgt>
+                                        </p:tgtEl>
+                                      </p:cBhvr>
+                                    </p:animEffect>
+                                  </p:childTnLst>
+                                </p:cTn>
+                              </p:par>
+                            </p:childTnLst>
+                          </p:cTn>
+                        </p:par>
+                      </p:childTnLst>
+                    </p:cTn>
+                  </p:par>
+                </p:childTnLst>
+              </p:cTn>
+              <p:prevCondLst>
+                <p:cond evt="onPrev" delay="0">
+                  <p:tgtEl>
+                    <p:sldTgt/>
+                  </p:tgtEl>
+                </p:cond>
+              </p:prevCondLst>
+              <p:nextCondLst>
+                <p:cond evt="onNext" delay="0">
+                  <p:tgtEl>
+                    <p:sldTgt/>
+                  </p:tgtEl>
+                </p:cond>
+              </p:nextCondLst>
+            </p:seq>
+          </p:childTnLst>
+        </p:cTn>
       </p:par>
     </p:tnLst>
   </p:timing>

</xml_diff>